<commit_message>
sccb and io testing updates
</commit_message>
<xml_diff>
--- a/RISCV FreeRTOS IGLOO2 Tutorial.pptx
+++ b/RISCV FreeRTOS IGLOO2 Tutorial.pptx
@@ -268,7 +268,7 @@
           <a:p>
             <a:fld id="{02EE89BC-6575-45C3-BF9B-DA9153772B8E}" type="datetimeFigureOut">
               <a:rPr lang="en-US" smtClean="0"/>
-              <a:t>11/5/2020</a:t>
+              <a:t>2/12/2021</a:t>
             </a:fld>
             <a:endParaRPr lang="en-US"/>
           </a:p>
@@ -466,7 +466,7 @@
           <a:p>
             <a:fld id="{02EE89BC-6575-45C3-BF9B-DA9153772B8E}" type="datetimeFigureOut">
               <a:rPr lang="en-US" smtClean="0"/>
-              <a:t>11/5/2020</a:t>
+              <a:t>2/12/2021</a:t>
             </a:fld>
             <a:endParaRPr lang="en-US"/>
           </a:p>
@@ -674,7 +674,7 @@
           <a:p>
             <a:fld id="{02EE89BC-6575-45C3-BF9B-DA9153772B8E}" type="datetimeFigureOut">
               <a:rPr lang="en-US" smtClean="0"/>
-              <a:t>11/5/2020</a:t>
+              <a:t>2/12/2021</a:t>
             </a:fld>
             <a:endParaRPr lang="en-US"/>
           </a:p>
@@ -872,7 +872,7 @@
           <a:p>
             <a:fld id="{02EE89BC-6575-45C3-BF9B-DA9153772B8E}" type="datetimeFigureOut">
               <a:rPr lang="en-US" smtClean="0"/>
-              <a:t>11/5/2020</a:t>
+              <a:t>2/12/2021</a:t>
             </a:fld>
             <a:endParaRPr lang="en-US"/>
           </a:p>
@@ -1147,7 +1147,7 @@
           <a:p>
             <a:fld id="{02EE89BC-6575-45C3-BF9B-DA9153772B8E}" type="datetimeFigureOut">
               <a:rPr lang="en-US" smtClean="0"/>
-              <a:t>11/5/2020</a:t>
+              <a:t>2/12/2021</a:t>
             </a:fld>
             <a:endParaRPr lang="en-US"/>
           </a:p>
@@ -1412,7 +1412,7 @@
           <a:p>
             <a:fld id="{02EE89BC-6575-45C3-BF9B-DA9153772B8E}" type="datetimeFigureOut">
               <a:rPr lang="en-US" smtClean="0"/>
-              <a:t>11/5/2020</a:t>
+              <a:t>2/12/2021</a:t>
             </a:fld>
             <a:endParaRPr lang="en-US"/>
           </a:p>
@@ -1824,7 +1824,7 @@
           <a:p>
             <a:fld id="{02EE89BC-6575-45C3-BF9B-DA9153772B8E}" type="datetimeFigureOut">
               <a:rPr lang="en-US" smtClean="0"/>
-              <a:t>11/5/2020</a:t>
+              <a:t>2/12/2021</a:t>
             </a:fld>
             <a:endParaRPr lang="en-US"/>
           </a:p>
@@ -1965,7 +1965,7 @@
           <a:p>
             <a:fld id="{02EE89BC-6575-45C3-BF9B-DA9153772B8E}" type="datetimeFigureOut">
               <a:rPr lang="en-US" smtClean="0"/>
-              <a:t>11/5/2020</a:t>
+              <a:t>2/12/2021</a:t>
             </a:fld>
             <a:endParaRPr lang="en-US"/>
           </a:p>
@@ -2078,7 +2078,7 @@
           <a:p>
             <a:fld id="{02EE89BC-6575-45C3-BF9B-DA9153772B8E}" type="datetimeFigureOut">
               <a:rPr lang="en-US" smtClean="0"/>
-              <a:t>11/5/2020</a:t>
+              <a:t>2/12/2021</a:t>
             </a:fld>
             <a:endParaRPr lang="en-US"/>
           </a:p>
@@ -2389,7 +2389,7 @@
           <a:p>
             <a:fld id="{02EE89BC-6575-45C3-BF9B-DA9153772B8E}" type="datetimeFigureOut">
               <a:rPr lang="en-US" smtClean="0"/>
-              <a:t>11/5/2020</a:t>
+              <a:t>2/12/2021</a:t>
             </a:fld>
             <a:endParaRPr lang="en-US"/>
           </a:p>
@@ -2677,7 +2677,7 @@
           <a:p>
             <a:fld id="{02EE89BC-6575-45C3-BF9B-DA9153772B8E}" type="datetimeFigureOut">
               <a:rPr lang="en-US" smtClean="0"/>
-              <a:t>11/5/2020</a:t>
+              <a:t>2/12/2021</a:t>
             </a:fld>
             <a:endParaRPr lang="en-US"/>
           </a:p>
@@ -2918,7 +2918,7 @@
           <a:p>
             <a:fld id="{02EE89BC-6575-45C3-BF9B-DA9153772B8E}" type="datetimeFigureOut">
               <a:rPr lang="en-US" smtClean="0"/>
-              <a:t>11/5/2020</a:t>
+              <a:t>2/12/2021</a:t>
             </a:fld>
             <a:endParaRPr lang="en-US"/>
           </a:p>
@@ -4343,126 +4343,6 @@
           </a:prstGeom>
         </p:spPr>
       </p:pic>
-      <p:sp>
-        <p:nvSpPr>
-          <p:cNvPr id="6" name="TextBox 5">
-            <a:extLst>
-              <a:ext uri="{FF2B5EF4-FFF2-40B4-BE49-F238E27FC236}">
-                <a16:creationId xmlns:a16="http://schemas.microsoft.com/office/drawing/2014/main" id="{02EB6A9C-1C2B-4614-B278-C5E225421B9C}"/>
-              </a:ext>
-            </a:extLst>
-          </p:cNvPr>
-          <p:cNvSpPr txBox="1"/>
-          <p:nvPr/>
-        </p:nvSpPr>
-        <p:spPr>
-          <a:xfrm>
-            <a:off x="1187076" y="1745918"/>
-            <a:ext cx="6221506" cy="3970318"/>
-          </a:xfrm>
-          <a:prstGeom prst="rect">
-            <a:avLst/>
-          </a:prstGeom>
-          <a:noFill/>
-        </p:spPr>
-        <p:txBody>
-          <a:bodyPr wrap="square" rtlCol="0">
-            <a:spAutoFit/>
-          </a:bodyPr>
-          <a:lstStyle/>
-          <a:p>
-            <a:r>
-              <a:rPr lang="en-US" dirty="0"/>
-              <a:t>Cortex-M3 process, which is configure for MSS</a:t>
-            </a:r>
-          </a:p>
-          <a:p>
-            <a:r>
-              <a:rPr lang="en-US" dirty="0"/>
-              <a:t>Offers four Fabric Interface Controller (FIC):</a:t>
-            </a:r>
-          </a:p>
-          <a:p>
-            <a:pPr marL="342900" indent="-342900">
-              <a:buAutoNum type="arabicPeriod"/>
-            </a:pPr>
-            <a:r>
-              <a:rPr lang="en-US" dirty="0"/>
-              <a:t>DDR_FIC</a:t>
-            </a:r>
-          </a:p>
-          <a:p>
-            <a:pPr marL="800100" lvl="1" indent="-342900">
-              <a:buFont typeface="Arial" panose="020B0604020202020204" pitchFamily="34" charset="0"/>
-              <a:buChar char="•"/>
-            </a:pPr>
-            <a:r>
-              <a:rPr lang="en-US" dirty="0"/>
-              <a:t>Used when you </a:t>
-            </a:r>
-            <a:r>
-              <a:rPr lang="en-US" dirty="0" err="1"/>
-              <a:t>configureMSS</a:t>
-            </a:r>
-            <a:r>
-              <a:rPr lang="en-US" dirty="0"/>
-              <a:t> DDR block (MDDR) such that external DDR memory can be accessed from FPGA fabric master via AXI or </a:t>
-            </a:r>
-            <a:r>
-              <a:rPr lang="en-US" dirty="0" err="1"/>
-              <a:t>AHBLite</a:t>
-            </a:r>
-            <a:endParaRPr lang="en-US" dirty="0"/>
-          </a:p>
-          <a:p>
-            <a:pPr marL="342900" indent="-342900">
-              <a:buAutoNum type="arabicPeriod"/>
-            </a:pPr>
-            <a:r>
-              <a:rPr lang="en-US" dirty="0"/>
-              <a:t>SMC_FIC</a:t>
-            </a:r>
-          </a:p>
-          <a:p>
-            <a:pPr marL="800100" lvl="1" indent="-342900">
-              <a:buFont typeface="Arial" panose="020B0604020202020204" pitchFamily="34" charset="0"/>
-              <a:buChar char="•"/>
-            </a:pPr>
-            <a:r>
-              <a:rPr lang="en-US" dirty="0"/>
-              <a:t>Used when you configure MSS DDR Block in Single Date Rate (SDR) mode</a:t>
-            </a:r>
-          </a:p>
-          <a:p>
-            <a:pPr marL="800100" lvl="1" indent="-342900">
-              <a:buFont typeface="Arial" panose="020B0604020202020204" pitchFamily="34" charset="0"/>
-              <a:buChar char="•"/>
-            </a:pPr>
-            <a:endParaRPr lang="en-US" dirty="0"/>
-          </a:p>
-          <a:p>
-            <a:pPr marL="342900" indent="-342900">
-              <a:buAutoNum type="arabicPeriod"/>
-            </a:pPr>
-            <a:r>
-              <a:rPr lang="en-US" dirty="0"/>
-              <a:t>FIC_0 and FIC_1 (depending on device)</a:t>
-            </a:r>
-          </a:p>
-          <a:p>
-            <a:r>
-              <a:rPr lang="en-US" dirty="0"/>
-              <a:t>These interface blocks enable MSS to interface with logic implementation in FPGA fabric and vice versa</a:t>
-            </a:r>
-          </a:p>
-          <a:p>
-            <a:pPr marL="342900" indent="-342900">
-              <a:buAutoNum type="arabicPeriod"/>
-            </a:pPr>
-            <a:endParaRPr lang="en-US" dirty="0"/>
-          </a:p>
-        </p:txBody>
-      </p:sp>
     </p:spTree>
     <p:extLst>
       <p:ext uri="{BB962C8B-B14F-4D97-AF65-F5344CB8AC3E}">

</xml_diff>